<commit_message>
Initial project progress report - 2026-02-20 baseline
</commit_message>
<xml_diff>
--- a/template/report_template.pptx
+++ b/template/report_template.pptx
@@ -104,11 +104,6 @@
       </a:defRPr>
     </a:lvl9pPr>
   </p:defaultTextStyle>
-  <p:extLst>
-    <p:ext uri="{EFAFB233-063F-42B5-8137-9DF3F51BA10A}">
-      <p15:sldGuideLst xmlns:p15="http://schemas.microsoft.com/office/powerpoint/2012/main"/>
-    </p:ext>
-  </p:extLst>
 </p:presentation>
 </file>
 
@@ -117,6 +112,7 @@
   <p1510:revLst>
     <p1510:client id="{238856C4-B02F-42F2-A518-8FCC5FFB7614}" v="101" dt="2026-02-20T23:50:30.076"/>
     <p1510:client id="{303D1C9E-38E9-4B65-A6F0-673A3AE61D80}" v="1052" dt="2026-02-21T14:42:52.577"/>
+    <p1510:client id="{32F04071-BB72-4793-A82B-37649234B162}" v="26" dt="2026-02-22T01:21:54.151"/>
     <p1510:client id="{718242DC-7371-4C23-85CF-9DB7F73C0EE4}" v="110" dt="2026-02-21T15:13:14.990"/>
     <p1510:client id="{927BB956-4A1A-4BE5-91CB-CE5D34BF0016}" v="1" dt="2026-02-20T23:53:19.314"/>
   </p1510:revLst>
@@ -4307,8 +4303,8 @@
         </p:nvSpPr>
         <p:spPr>
           <a:xfrm>
-            <a:off x="2734256" y="2842765"/>
-            <a:ext cx="1588131" cy="317982"/>
+            <a:off x="2296745" y="2897453"/>
+            <a:ext cx="2025642" cy="307777"/>
           </a:xfrm>
           <a:prstGeom prst="rect">
             <a:avLst/>
@@ -4346,8 +4342,8 @@
         </p:nvSpPr>
         <p:spPr>
           <a:xfrm>
-            <a:off x="2621997" y="3663099"/>
-            <a:ext cx="1700390" cy="307777"/>
+            <a:off x="2173548" y="3597473"/>
+            <a:ext cx="2148839" cy="307777"/>
           </a:xfrm>
           <a:prstGeom prst="rect">
             <a:avLst/>
@@ -4385,8 +4381,8 @@
         </p:nvSpPr>
         <p:spPr>
           <a:xfrm>
-            <a:off x="2611792" y="4358773"/>
-            <a:ext cx="1710595" cy="307777"/>
+            <a:off x="2305534" y="4369710"/>
+            <a:ext cx="2016853" cy="318715"/>
           </a:xfrm>
           <a:prstGeom prst="rect">
             <a:avLst/>
@@ -4425,8 +4421,8 @@
         </p:nvSpPr>
         <p:spPr>
           <a:xfrm>
-            <a:off x="2917952" y="5123685"/>
-            <a:ext cx="1404435" cy="307777"/>
+            <a:off x="2480441" y="5101810"/>
+            <a:ext cx="1841946" cy="307777"/>
           </a:xfrm>
           <a:prstGeom prst="rect">
             <a:avLst/>
@@ -4444,7 +4440,7 @@
           <a:p>
             <a:pPr algn="r"/>
             <a:r>
-              <a:rPr lang="es-ES" sz="1400" dirty="0"/>
+              <a:rPr lang="es-ES" sz="1400"/>
               <a:t>FEB 11</a:t>
             </a:r>
           </a:p>
@@ -4464,8 +4460,8 @@
         </p:nvSpPr>
         <p:spPr>
           <a:xfrm>
-            <a:off x="2856720" y="5910474"/>
-            <a:ext cx="1465667" cy="307777"/>
+            <a:off x="2473898" y="5932349"/>
+            <a:ext cx="1848489" cy="307777"/>
           </a:xfrm>
           <a:prstGeom prst="rect">
             <a:avLst/>
@@ -4483,7 +4479,7 @@
           <a:p>
             <a:pPr algn="r"/>
             <a:r>
-              <a:rPr lang="es-ES" sz="1400" dirty="0"/>
+              <a:rPr lang="es-ES" sz="1400"/>
               <a:t>FEB11</a:t>
             </a:r>
             <a:endParaRPr lang="es-ES"/>
@@ -5042,8 +5038,8 @@
         </p:nvSpPr>
         <p:spPr>
           <a:xfrm>
-            <a:off x="5979527" y="1717610"/>
-            <a:ext cx="2335816" cy="307777"/>
+            <a:off x="5935776" y="1695734"/>
+            <a:ext cx="2992083" cy="307777"/>
           </a:xfrm>
           <a:prstGeom prst="rect">
             <a:avLst/>
@@ -5084,8 +5080,8 @@
         </p:nvSpPr>
         <p:spPr>
           <a:xfrm>
-            <a:off x="5946714" y="1411352"/>
-            <a:ext cx="2335816" cy="307777"/>
+            <a:off x="5924838" y="1389477"/>
+            <a:ext cx="2937395" cy="307777"/>
           </a:xfrm>
           <a:prstGeom prst="rect">
             <a:avLst/>
@@ -5127,7 +5123,7 @@
         <p:spPr>
           <a:xfrm>
             <a:off x="5946713" y="1105093"/>
-            <a:ext cx="2335816" cy="307777"/>
+            <a:ext cx="2992083" cy="307777"/>
           </a:xfrm>
           <a:prstGeom prst="rect">
             <a:avLst/>
@@ -5186,7 +5182,7 @@
           <a:lstStyle/>
           <a:p>
             <a:r>
-              <a:rPr lang="es-ES" sz="1200" dirty="0"/>
+              <a:rPr lang="es-ES" sz="1200"/>
               <a:t>Project </a:t>
             </a:r>
             <a:r>
@@ -5211,8 +5207,8 @@
         </p:nvSpPr>
         <p:spPr>
           <a:xfrm>
-            <a:off x="497961" y="211623"/>
-            <a:ext cx="6167038" cy="523220"/>
+            <a:off x="323689" y="259769"/>
+            <a:ext cx="8504064" cy="430887"/>
           </a:xfrm>
           <a:prstGeom prst="rect">
             <a:avLst/>
@@ -5229,7 +5225,7 @@
           <a:lstStyle/>
           <a:p>
             <a:r>
-              <a:rPr lang="es-ES" sz="2800" b="1"/>
+              <a:rPr lang="es-ES" sz="2200" b="1" dirty="0"/>
               <a:t>Proyecto: RPA Ventas Crédito/SAP</a:t>
             </a:r>
           </a:p>
@@ -5268,14 +5264,24 @@
           <a:p>
             <a:pPr algn="ctr"/>
             <a:r>
-              <a:rPr lang="es-ES" sz="2800" b="1">
+              <a:rPr lang="es-ES" sz="2800" b="1" dirty="0">
                 <a:solidFill>
-                  <a:srgbClr val="FC8F30"/>
+                  <a:schemeClr val="accent1">
+                    <a:lumMod val="60000"/>
+                    <a:lumOff val="40000"/>
+                  </a:schemeClr>
                 </a:solidFill>
               </a:rPr>
               <a:t>20%</a:t>
             </a:r>
-            <a:endParaRPr lang="es-ES"/>
+            <a:endParaRPr lang="es-ES" dirty="0">
+              <a:solidFill>
+                <a:schemeClr val="accent1">
+                  <a:lumMod val="60000"/>
+                  <a:lumOff val="40000"/>
+                </a:schemeClr>
+              </a:solidFill>
+            </a:endParaRPr>
           </a:p>
         </p:txBody>
       </p:sp>
@@ -5390,7 +5396,7 @@
           <a:lstStyle/>
           <a:p>
             <a:r>
-              <a:rPr lang="es-ES" sz="1400" b="1" dirty="0">
+              <a:rPr lang="es-ES" sz="1400" b="1">
                 <a:solidFill>
                   <a:schemeClr val="tx1">
                     <a:lumMod val="76000"/>
@@ -5460,7 +5466,7 @@
           <a:lstStyle/>
           <a:p>
             <a:r>
-              <a:rPr lang="es-ES" sz="1400" b="1" dirty="0">
+              <a:rPr lang="es-ES" sz="1400" b="1">
                 <a:solidFill>
                   <a:schemeClr val="tx1">
                     <a:lumMod val="76000"/>

</xml_diff>